<commit_message>
update with delphi prog
</commit_message>
<xml_diff>
--- a/ЛБ1_blending/ЛБ_1_delphi_app.pptx
+++ b/ЛБ1_blending/ЛБ_1_delphi_app.pptx
@@ -116,7 +116,7 @@
   </p:defaultTextStyle>
   <p:extLst>
     <p:ext uri="{EFAFB233-063F-42B5-8137-9DF3F51BA10A}">
-      <p15:sldGuideLst xmlns:p15="http://schemas.microsoft.com/office/powerpoint/2012/main">
+      <p15:sldGuideLst xmlns:p15="http://schemas.microsoft.com/office/powerpoint/2012/main" xmlns="">
         <p15:guide id="1" orient="horz" pos="2160">
           <p15:clr>
             <a:srgbClr val="A4A3A4"/>
@@ -215,7 +215,7 @@
           <a:p>
             <a:fld id="{3A960DF9-DE47-4E4A-B265-34572ADD54FA}" type="datetimeFigureOut">
               <a:rPr lang="ru-RU" smtClean="0"/>
-              <a:t>16.02.2020</a:t>
+              <a:t>17.02.2020</a:t>
             </a:fld>
             <a:endParaRPr lang="ru-RU"/>
           </a:p>
@@ -1201,7 +1201,7 @@
           <a:p>
             <a:fld id="{01638D28-19CB-4FAE-9550-B87ED5489EA0}" type="datetime1">
               <a:rPr lang="ru-RU" smtClean="0"/>
-              <a:t>16.02.2020</a:t>
+              <a:t>17.02.2020</a:t>
             </a:fld>
             <a:endParaRPr lang="ru-RU"/>
           </a:p>
@@ -1371,7 +1371,7 @@
           <a:p>
             <a:fld id="{5FE6677C-6E8F-436D-A3C0-5774BF220D66}" type="datetime1">
               <a:rPr lang="ru-RU" smtClean="0"/>
-              <a:t>16.02.2020</a:t>
+              <a:t>17.02.2020</a:t>
             </a:fld>
             <a:endParaRPr lang="ru-RU"/>
           </a:p>
@@ -1551,7 +1551,7 @@
           <a:p>
             <a:fld id="{3207AA99-0083-4714-88C2-C9A915B7E3F2}" type="datetime1">
               <a:rPr lang="ru-RU" smtClean="0"/>
-              <a:t>16.02.2020</a:t>
+              <a:t>17.02.2020</a:t>
             </a:fld>
             <a:endParaRPr lang="ru-RU"/>
           </a:p>
@@ -1721,7 +1721,7 @@
           <a:p>
             <a:fld id="{83AA6F10-1DFF-45A0-B2A5-E89521E0E0F6}" type="datetime1">
               <a:rPr lang="ru-RU" smtClean="0"/>
-              <a:t>16.02.2020</a:t>
+              <a:t>17.02.2020</a:t>
             </a:fld>
             <a:endParaRPr lang="ru-RU"/>
           </a:p>
@@ -1979,7 +1979,7 @@
           <a:p>
             <a:fld id="{F2EB7287-6B8E-4993-8153-33DA0C3BBE25}" type="datetime1">
               <a:rPr lang="ru-RU" smtClean="0"/>
-              <a:t>16.02.2020</a:t>
+              <a:t>17.02.2020</a:t>
             </a:fld>
             <a:endParaRPr lang="ru-RU"/>
           </a:p>
@@ -2211,7 +2211,7 @@
           <a:p>
             <a:fld id="{2B0D1166-EC30-46EA-8ACA-7C1747D0DDD9}" type="datetime1">
               <a:rPr lang="ru-RU" smtClean="0"/>
-              <a:t>16.02.2020</a:t>
+              <a:t>17.02.2020</a:t>
             </a:fld>
             <a:endParaRPr lang="ru-RU"/>
           </a:p>
@@ -2578,7 +2578,7 @@
           <a:p>
             <a:fld id="{6D285674-35E0-4819-89D9-DAA7EC26D547}" type="datetime1">
               <a:rPr lang="ru-RU" smtClean="0"/>
-              <a:t>16.02.2020</a:t>
+              <a:t>17.02.2020</a:t>
             </a:fld>
             <a:endParaRPr lang="ru-RU"/>
           </a:p>
@@ -2696,7 +2696,7 @@
           <a:p>
             <a:fld id="{5DB341C1-284F-4FCF-8EF1-8AAEABF17F04}" type="datetime1">
               <a:rPr lang="ru-RU" smtClean="0"/>
-              <a:t>16.02.2020</a:t>
+              <a:t>17.02.2020</a:t>
             </a:fld>
             <a:endParaRPr lang="ru-RU"/>
           </a:p>
@@ -2791,7 +2791,7 @@
           <a:p>
             <a:fld id="{9434A572-EFFC-486D-B197-147F4721CFA3}" type="datetime1">
               <a:rPr lang="ru-RU" smtClean="0"/>
-              <a:t>16.02.2020</a:t>
+              <a:t>17.02.2020</a:t>
             </a:fld>
             <a:endParaRPr lang="ru-RU"/>
           </a:p>
@@ -3068,7 +3068,7 @@
           <a:p>
             <a:fld id="{5FA37F02-EF3C-4799-AE4D-B4C7A5E5C79F}" type="datetime1">
               <a:rPr lang="ru-RU" smtClean="0"/>
-              <a:t>16.02.2020</a:t>
+              <a:t>17.02.2020</a:t>
             </a:fld>
             <a:endParaRPr lang="ru-RU"/>
           </a:p>
@@ -3325,7 +3325,7 @@
           <a:p>
             <a:fld id="{BE9F2DA6-2692-49BF-84EF-4287402EC2DF}" type="datetime1">
               <a:rPr lang="ru-RU" smtClean="0"/>
-              <a:t>16.02.2020</a:t>
+              <a:t>17.02.2020</a:t>
             </a:fld>
             <a:endParaRPr lang="ru-RU"/>
           </a:p>
@@ -3538,7 +3538,7 @@
           <a:p>
             <a:fld id="{606B48B0-CF22-467F-9224-AB92A8FE570F}" type="datetime1">
               <a:rPr lang="ru-RU" smtClean="0"/>
-              <a:t>16.02.2020</a:t>
+              <a:t>17.02.2020</a:t>
             </a:fld>
             <a:endParaRPr lang="ru-RU"/>
           </a:p>
@@ -4457,14 +4457,24 @@
               </a:spcBef>
             </a:pPr>
             <a:r>
-              <a:rPr lang="ru-RU" altLang="ru-RU" sz="2063" b="1" dirty="0">
+              <a:rPr lang="ru-RU" altLang="ru-RU" sz="2063" b="1" dirty="0" smtClean="0">
                 <a:solidFill>
                   <a:schemeClr val="bg2">
                     <a:lumMod val="75000"/>
                   </a:schemeClr>
                 </a:solidFill>
               </a:rPr>
-              <a:t>Выполнил доцент ОХИ ИШПР ТПУ, к.т.н.</a:t>
+              <a:t>доцент </a:t>
+            </a:r>
+            <a:r>
+              <a:rPr lang="ru-RU" altLang="ru-RU" sz="2063" b="1" dirty="0">
+                <a:solidFill>
+                  <a:schemeClr val="bg2">
+                    <a:lumMod val="75000"/>
+                  </a:schemeClr>
+                </a:solidFill>
+              </a:rPr>
+              <a:t>ОХИ ИШПР ТПУ, к.т.н.</a:t>
             </a:r>
           </a:p>
           <a:p>
@@ -7580,6 +7590,13 @@
   <p:clrMapOvr>
     <a:masterClrMapping/>
   </p:clrMapOvr>
+  <p:timing>
+    <p:tnLst>
+      <p:par>
+        <p:cTn id="1" dur="indefinite" restart="never" nodeType="tmRoot"/>
+      </p:par>
+    </p:tnLst>
+  </p:timing>
 </p:sld>
 </file>
 
@@ -10916,7 +10933,7 @@
           <p:cNvPr id="4" name="Рисунок 3">
             <a:extLst>
               <a:ext uri="{FF2B5EF4-FFF2-40B4-BE49-F238E27FC236}">
-                <a16:creationId xmlns:a16="http://schemas.microsoft.com/office/drawing/2014/main" id="{E2486297-AC4C-497B-BD99-87D2DA8CB734}"/>
+                <a16:creationId xmlns:a16="http://schemas.microsoft.com/office/drawing/2014/main" xmlns="" id="{E2486297-AC4C-497B-BD99-87D2DA8CB734}"/>
               </a:ext>
             </a:extLst>
           </p:cNvPr>
@@ -10945,7 +10962,7 @@
           <p:cNvPr id="7" name="Рисунок 6">
             <a:extLst>
               <a:ext uri="{FF2B5EF4-FFF2-40B4-BE49-F238E27FC236}">
-                <a16:creationId xmlns:a16="http://schemas.microsoft.com/office/drawing/2014/main" id="{4044E9DE-7C7F-47A4-9C7E-6EA8A13762A1}"/>
+                <a16:creationId xmlns:a16="http://schemas.microsoft.com/office/drawing/2014/main" xmlns="" id="{4044E9DE-7C7F-47A4-9C7E-6EA8A13762A1}"/>
               </a:ext>
             </a:extLst>
           </p:cNvPr>
@@ -10980,6 +10997,13 @@
   <p:clrMapOvr>
     <a:masterClrMapping/>
   </p:clrMapOvr>
+  <p:timing>
+    <p:tnLst>
+      <p:par>
+        <p:cTn id="1" dur="indefinite" restart="never" nodeType="tmRoot"/>
+      </p:par>
+    </p:tnLst>
+  </p:timing>
 </p:sld>
 </file>
 
@@ -14316,7 +14340,7 @@
           <p:cNvPr id="2" name="TextBox 1">
             <a:extLst>
               <a:ext uri="{FF2B5EF4-FFF2-40B4-BE49-F238E27FC236}">
-                <a16:creationId xmlns:a16="http://schemas.microsoft.com/office/drawing/2014/main" id="{0C23716F-7EC3-43A3-89F1-979E3101CDB7}"/>
+                <a16:creationId xmlns:a16="http://schemas.microsoft.com/office/drawing/2014/main" xmlns="" id="{0C23716F-7EC3-43A3-89F1-979E3101CDB7}"/>
               </a:ext>
             </a:extLst>
           </p:cNvPr>
@@ -14487,6 +14511,13 @@
   <p:clrMapOvr>
     <a:masterClrMapping/>
   </p:clrMapOvr>
+  <p:timing>
+    <p:tnLst>
+      <p:par>
+        <p:cTn id="1" dur="indefinite" restart="never" nodeType="tmRoot"/>
+      </p:par>
+    </p:tnLst>
+  </p:timing>
 </p:sld>
 </file>
 
@@ -17845,7 +17876,7 @@
           <p:cNvPr id="5" name="Прямоугольник 4">
             <a:extLst>
               <a:ext uri="{FF2B5EF4-FFF2-40B4-BE49-F238E27FC236}">
-                <a16:creationId xmlns:a16="http://schemas.microsoft.com/office/drawing/2014/main" id="{7D7936F0-7527-4C0B-9394-21FB88E7E822}"/>
+                <a16:creationId xmlns:a16="http://schemas.microsoft.com/office/drawing/2014/main" xmlns="" id="{7D7936F0-7527-4C0B-9394-21FB88E7E822}"/>
               </a:ext>
             </a:extLst>
           </p:cNvPr>
@@ -18133,6 +18164,15 @@
               </a:rPr>
               <a:t>)+</a:t>
             </a:r>
+            <a:r>
+              <a:rPr lang="ru-RU" sz="1400" dirty="0">
+                <a:solidFill>
+                  <a:srgbClr val="000000"/>
+                </a:solidFill>
+                <a:latin typeface="Courier New" panose="02070309020205020404" pitchFamily="49" charset="0"/>
+              </a:rPr>
+              <a:t/>
+            </a:r>
             <a:br>
               <a:rPr lang="ru-RU" sz="1400" dirty="0">
                 <a:solidFill>
@@ -18186,6 +18226,15 @@
               </a:rPr>
               <a:t>,</a:t>
             </a:r>
+            <a:r>
+              <a:rPr lang="ru-RU" sz="1400" dirty="0">
+                <a:solidFill>
+                  <a:srgbClr val="000000"/>
+                </a:solidFill>
+                <a:latin typeface="Courier New" panose="02070309020205020404" pitchFamily="49" charset="0"/>
+              </a:rPr>
+              <a:t/>
+            </a:r>
             <a:br>
               <a:rPr lang="ru-RU" sz="1400" dirty="0">
                 <a:solidFill>
@@ -18257,6 +18306,15 @@
               </a:rPr>
               <a:t>,</a:t>
             </a:r>
+            <a:r>
+              <a:rPr lang="ru-RU" sz="1400" dirty="0">
+                <a:solidFill>
+                  <a:srgbClr val="000000"/>
+                </a:solidFill>
+                <a:latin typeface="Courier New" panose="02070309020205020404" pitchFamily="49" charset="0"/>
+              </a:rPr>
+              <a:t/>
+            </a:r>
             <a:br>
               <a:rPr lang="ru-RU" sz="1400" dirty="0">
                 <a:solidFill>
@@ -18328,6 +18386,15 @@
               </a:rPr>
               <a:t>,</a:t>
             </a:r>
+            <a:r>
+              <a:rPr lang="ru-RU" sz="1400" dirty="0">
+                <a:solidFill>
+                  <a:srgbClr val="000000"/>
+                </a:solidFill>
+                <a:latin typeface="Courier New" panose="02070309020205020404" pitchFamily="49" charset="0"/>
+              </a:rPr>
+              <a:t/>
+            </a:r>
             <a:br>
               <a:rPr lang="ru-RU" sz="1400" dirty="0">
                 <a:solidFill>
@@ -18389,6 +18456,15 @@
                 <a:latin typeface="Courier New" panose="02070309020205020404" pitchFamily="49" charset="0"/>
               </a:rPr>
               <a:t> EmptyParam, </a:t>
+            </a:r>
+            <a:r>
+              <a:rPr lang="ru-RU" sz="1400" dirty="0">
+                <a:solidFill>
+                  <a:srgbClr val="000000"/>
+                </a:solidFill>
+                <a:latin typeface="Courier New" panose="02070309020205020404" pitchFamily="49" charset="0"/>
+              </a:rPr>
+              <a:t/>
             </a:r>
             <a:br>
               <a:rPr lang="ru-RU" sz="1400" dirty="0">
@@ -22066,7 +22142,7 @@
           <p:cNvPr id="2" name="Прямоугольник 1">
             <a:extLst>
               <a:ext uri="{FF2B5EF4-FFF2-40B4-BE49-F238E27FC236}">
-                <a16:creationId xmlns:a16="http://schemas.microsoft.com/office/drawing/2014/main" id="{B8699A09-4407-4F79-A4A7-1EE65107BE95}"/>
+                <a16:creationId xmlns:a16="http://schemas.microsoft.com/office/drawing/2014/main" xmlns="" id="{B8699A09-4407-4F79-A4A7-1EE65107BE95}"/>
               </a:ext>
             </a:extLst>
           </p:cNvPr>
@@ -26227,7 +26303,7 @@
           <p:cNvPr id="4" name="Прямоугольник 3">
             <a:extLst>
               <a:ext uri="{FF2B5EF4-FFF2-40B4-BE49-F238E27FC236}">
-                <a16:creationId xmlns:a16="http://schemas.microsoft.com/office/drawing/2014/main" id="{8810CEDD-CAC0-4AFD-808F-23AB4B270710}"/>
+                <a16:creationId xmlns:a16="http://schemas.microsoft.com/office/drawing/2014/main" xmlns="" id="{8810CEDD-CAC0-4AFD-808F-23AB4B270710}"/>
               </a:ext>
             </a:extLst>
           </p:cNvPr>
@@ -30653,7 +30729,7 @@
           <p:cNvPr id="5" name="Прямоугольник 4">
             <a:extLst>
               <a:ext uri="{FF2B5EF4-FFF2-40B4-BE49-F238E27FC236}">
-                <a16:creationId xmlns:a16="http://schemas.microsoft.com/office/drawing/2014/main" id="{9CA68239-8444-4333-89DA-055CCF84C748}"/>
+                <a16:creationId xmlns:a16="http://schemas.microsoft.com/office/drawing/2014/main" xmlns="" id="{9CA68239-8444-4333-89DA-055CCF84C748}"/>
               </a:ext>
             </a:extLst>
           </p:cNvPr>
@@ -35106,7 +35182,7 @@
           <p:cNvPr id="2" name="TextBox 1">
             <a:extLst>
               <a:ext uri="{FF2B5EF4-FFF2-40B4-BE49-F238E27FC236}">
-                <a16:creationId xmlns:a16="http://schemas.microsoft.com/office/drawing/2014/main" id="{E73D6206-C78F-4EDC-BB52-C6FC880528DD}"/>
+                <a16:creationId xmlns:a16="http://schemas.microsoft.com/office/drawing/2014/main" xmlns="" id="{E73D6206-C78F-4EDC-BB52-C6FC880528DD}"/>
               </a:ext>
             </a:extLst>
           </p:cNvPr>
@@ -35157,7 +35233,7 @@
           <p:cNvPr id="4" name="Прямоугольник 3">
             <a:extLst>
               <a:ext uri="{FF2B5EF4-FFF2-40B4-BE49-F238E27FC236}">
-                <a16:creationId xmlns:a16="http://schemas.microsoft.com/office/drawing/2014/main" id="{5C4AC95B-605B-427D-8082-2C6A32437478}"/>
+                <a16:creationId xmlns:a16="http://schemas.microsoft.com/office/drawing/2014/main" xmlns="" id="{5C4AC95B-605B-427D-8082-2C6A32437478}"/>
               </a:ext>
             </a:extLst>
           </p:cNvPr>
@@ -35291,7 +35367,7 @@
           <p:cNvPr id="6" name="Прямоугольник 5">
             <a:extLst>
               <a:ext uri="{FF2B5EF4-FFF2-40B4-BE49-F238E27FC236}">
-                <a16:creationId xmlns:a16="http://schemas.microsoft.com/office/drawing/2014/main" id="{9F95C6D3-C1E4-46F3-9E1A-CD0EE7E934B5}"/>
+                <a16:creationId xmlns:a16="http://schemas.microsoft.com/office/drawing/2014/main" xmlns="" id="{9F95C6D3-C1E4-46F3-9E1A-CD0EE7E934B5}"/>
               </a:ext>
             </a:extLst>
           </p:cNvPr>
@@ -35333,7 +35409,7 @@
           <p:cNvPr id="18" name="TextBox 17">
             <a:extLst>
               <a:ext uri="{FF2B5EF4-FFF2-40B4-BE49-F238E27FC236}">
-                <a16:creationId xmlns:a16="http://schemas.microsoft.com/office/drawing/2014/main" id="{8911D3B6-AB88-4209-A088-1148FA76114F}"/>
+                <a16:creationId xmlns:a16="http://schemas.microsoft.com/office/drawing/2014/main" xmlns="" id="{8911D3B6-AB88-4209-A088-1148FA76114F}"/>
               </a:ext>
             </a:extLst>
           </p:cNvPr>
@@ -35422,7 +35498,7 @@
           <p:cNvPr id="19" name="Прямоугольник 18">
             <a:extLst>
               <a:ext uri="{FF2B5EF4-FFF2-40B4-BE49-F238E27FC236}">
-                <a16:creationId xmlns:a16="http://schemas.microsoft.com/office/drawing/2014/main" id="{325AF21D-A50E-4810-B6F8-573B7BFB1A0F}"/>
+                <a16:creationId xmlns:a16="http://schemas.microsoft.com/office/drawing/2014/main" xmlns="" id="{325AF21D-A50E-4810-B6F8-573B7BFB1A0F}"/>
               </a:ext>
             </a:extLst>
           </p:cNvPr>
@@ -35464,7 +35540,7 @@
           <p:cNvPr id="20" name="TextBox 19">
             <a:extLst>
               <a:ext uri="{FF2B5EF4-FFF2-40B4-BE49-F238E27FC236}">
-                <a16:creationId xmlns:a16="http://schemas.microsoft.com/office/drawing/2014/main" id="{979C1BEA-DC8D-4E74-8382-E3469E555946}"/>
+                <a16:creationId xmlns:a16="http://schemas.microsoft.com/office/drawing/2014/main" xmlns="" id="{979C1BEA-DC8D-4E74-8382-E3469E555946}"/>
               </a:ext>
             </a:extLst>
           </p:cNvPr>
@@ -35533,7 +35609,7 @@
           <p:cNvPr id="21" name="TextBox 20">
             <a:extLst>
               <a:ext uri="{FF2B5EF4-FFF2-40B4-BE49-F238E27FC236}">
-                <a16:creationId xmlns:a16="http://schemas.microsoft.com/office/drawing/2014/main" id="{7808F9BA-1CF3-4D88-8BA2-3AA5795EB0AE}"/>
+                <a16:creationId xmlns:a16="http://schemas.microsoft.com/office/drawing/2014/main" xmlns="" id="{7808F9BA-1CF3-4D88-8BA2-3AA5795EB0AE}"/>
               </a:ext>
             </a:extLst>
           </p:cNvPr>
@@ -35584,7 +35660,7 @@
           <p:cNvPr id="7" name="Прямоугольник 6">
             <a:extLst>
               <a:ext uri="{FF2B5EF4-FFF2-40B4-BE49-F238E27FC236}">
-                <a16:creationId xmlns:a16="http://schemas.microsoft.com/office/drawing/2014/main" id="{B37B27E6-6BF4-486A-A6EA-A6579A26C568}"/>
+                <a16:creationId xmlns:a16="http://schemas.microsoft.com/office/drawing/2014/main" xmlns="" id="{B37B27E6-6BF4-486A-A6EA-A6579A26C568}"/>
               </a:ext>
             </a:extLst>
           </p:cNvPr>
@@ -35916,7 +35992,7 @@
   <a:extraClrSchemeLst/>
   <a:extLst>
     <a:ext uri="{05A4C25C-085E-4340-85A3-A5531E510DB2}">
-      <thm15:themeFamily xmlns:thm15="http://schemas.microsoft.com/office/thememl/2012/main" name="Office Theme" id="{62F939B6-93AF-4DB8-9C6B-D6C7DFDC589F}" vid="{4A3C46E8-61CC-4603-A589-7422A47A8E4A}"/>
+      <thm15:themeFamily xmlns:thm15="http://schemas.microsoft.com/office/thememl/2012/main" xmlns="" name="Office Theme" id="{62F939B6-93AF-4DB8-9C6B-D6C7DFDC589F}" vid="{4A3C46E8-61CC-4603-A589-7422A47A8E4A}"/>
     </a:ext>
   </a:extLst>
 </a:theme>
@@ -36177,7 +36253,7 @@
   <a:extraClrSchemeLst/>
   <a:extLst>
     <a:ext uri="{05A4C25C-085E-4340-85A3-A5531E510DB2}">
-      <thm15:themeFamily xmlns:thm15="http://schemas.microsoft.com/office/thememl/2012/main" name="Office Theme" id="{62F939B6-93AF-4DB8-9C6B-D6C7DFDC589F}" vid="{4A3C46E8-61CC-4603-A589-7422A47A8E4A}"/>
+      <thm15:themeFamily xmlns:thm15="http://schemas.microsoft.com/office/thememl/2012/main" xmlns="" name="Office Theme" id="{62F939B6-93AF-4DB8-9C6B-D6C7DFDC589F}" vid="{4A3C46E8-61CC-4603-A589-7422A47A8E4A}"/>
     </a:ext>
   </a:extLst>
 </a:theme>

</xml_diff>